<commit_message>
# 2.1 update presentation
</commit_message>
<xml_diff>
--- a/Pseudo-3D-Maze-YAL.pptx
+++ b/Pseudo-3D-Maze-YAL.pptx
@@ -6,6 +6,10 @@
   </p:sldMasterIdLst>
   <p:sldIdLst>
     <p:sldId id="256" r:id="rId2"/>
+    <p:sldId id="257" r:id="rId3"/>
+    <p:sldId id="258" r:id="rId4"/>
+    <p:sldId id="259" r:id="rId5"/>
+    <p:sldId id="260" r:id="rId6"/>
   </p:sldIdLst>
   <p:sldSz cx="12192000" cy="6858000"/>
   <p:notesSz cx="6858000" cy="9144000"/>
@@ -104,6 +108,11 @@
       </a:defRPr>
     </a:lvl9pPr>
   </p:defaultTextStyle>
+  <p:extLst>
+    <p:ext uri="{EFAFB233-063F-42B5-8137-9DF3F51BA10A}">
+      <p15:sldGuideLst xmlns:p15="http://schemas.microsoft.com/office/powerpoint/2012/main"/>
+    </p:ext>
+  </p:extLst>
 </p:presentation>
 </file>
 
@@ -238,7 +247,7 @@
           <a:p>
             <a:fld id="{F2D0C887-F644-4D22-856C-E92F84A15BCF}" type="datetimeFigureOut">
               <a:rPr lang="ru-RU" smtClean="0"/>
-              <a:t>24.01.2025</a:t>
+              <a:t>01.02.2025</a:t>
             </a:fld>
             <a:endParaRPr lang="ru-RU"/>
           </a:p>
@@ -408,7 +417,7 @@
           <a:p>
             <a:fld id="{F2D0C887-F644-4D22-856C-E92F84A15BCF}" type="datetimeFigureOut">
               <a:rPr lang="ru-RU" smtClean="0"/>
-              <a:t>24.01.2025</a:t>
+              <a:t>01.02.2025</a:t>
             </a:fld>
             <a:endParaRPr lang="ru-RU"/>
           </a:p>
@@ -588,7 +597,7 @@
           <a:p>
             <a:fld id="{F2D0C887-F644-4D22-856C-E92F84A15BCF}" type="datetimeFigureOut">
               <a:rPr lang="ru-RU" smtClean="0"/>
-              <a:t>24.01.2025</a:t>
+              <a:t>01.02.2025</a:t>
             </a:fld>
             <a:endParaRPr lang="ru-RU"/>
           </a:p>
@@ -758,7 +767,7 @@
           <a:p>
             <a:fld id="{F2D0C887-F644-4D22-856C-E92F84A15BCF}" type="datetimeFigureOut">
               <a:rPr lang="ru-RU" smtClean="0"/>
-              <a:t>24.01.2025</a:t>
+              <a:t>01.02.2025</a:t>
             </a:fld>
             <a:endParaRPr lang="ru-RU"/>
           </a:p>
@@ -1004,7 +1013,7 @@
           <a:p>
             <a:fld id="{F2D0C887-F644-4D22-856C-E92F84A15BCF}" type="datetimeFigureOut">
               <a:rPr lang="ru-RU" smtClean="0"/>
-              <a:t>24.01.2025</a:t>
+              <a:t>01.02.2025</a:t>
             </a:fld>
             <a:endParaRPr lang="ru-RU"/>
           </a:p>
@@ -1236,7 +1245,7 @@
           <a:p>
             <a:fld id="{F2D0C887-F644-4D22-856C-E92F84A15BCF}" type="datetimeFigureOut">
               <a:rPr lang="ru-RU" smtClean="0"/>
-              <a:t>24.01.2025</a:t>
+              <a:t>01.02.2025</a:t>
             </a:fld>
             <a:endParaRPr lang="ru-RU"/>
           </a:p>
@@ -1603,7 +1612,7 @@
           <a:p>
             <a:fld id="{F2D0C887-F644-4D22-856C-E92F84A15BCF}" type="datetimeFigureOut">
               <a:rPr lang="ru-RU" smtClean="0"/>
-              <a:t>24.01.2025</a:t>
+              <a:t>01.02.2025</a:t>
             </a:fld>
             <a:endParaRPr lang="ru-RU"/>
           </a:p>
@@ -1721,7 +1730,7 @@
           <a:p>
             <a:fld id="{F2D0C887-F644-4D22-856C-E92F84A15BCF}" type="datetimeFigureOut">
               <a:rPr lang="ru-RU" smtClean="0"/>
-              <a:t>24.01.2025</a:t>
+              <a:t>01.02.2025</a:t>
             </a:fld>
             <a:endParaRPr lang="ru-RU"/>
           </a:p>
@@ -1816,7 +1825,7 @@
           <a:p>
             <a:fld id="{F2D0C887-F644-4D22-856C-E92F84A15BCF}" type="datetimeFigureOut">
               <a:rPr lang="ru-RU" smtClean="0"/>
-              <a:t>24.01.2025</a:t>
+              <a:t>01.02.2025</a:t>
             </a:fld>
             <a:endParaRPr lang="ru-RU"/>
           </a:p>
@@ -2093,7 +2102,7 @@
           <a:p>
             <a:fld id="{F2D0C887-F644-4D22-856C-E92F84A15BCF}" type="datetimeFigureOut">
               <a:rPr lang="ru-RU" smtClean="0"/>
-              <a:t>24.01.2025</a:t>
+              <a:t>01.02.2025</a:t>
             </a:fld>
             <a:endParaRPr lang="ru-RU"/>
           </a:p>
@@ -2346,7 +2355,7 @@
           <a:p>
             <a:fld id="{F2D0C887-F644-4D22-856C-E92F84A15BCF}" type="datetimeFigureOut">
               <a:rPr lang="ru-RU" smtClean="0"/>
-              <a:t>24.01.2025</a:t>
+              <a:t>01.02.2025</a:t>
             </a:fld>
             <a:endParaRPr lang="ru-RU"/>
           </a:p>
@@ -2559,7 +2568,7 @@
           <a:p>
             <a:fld id="{F2D0C887-F644-4D22-856C-E92F84A15BCF}" type="datetimeFigureOut">
               <a:rPr lang="ru-RU" smtClean="0"/>
-              <a:t>24.01.2025</a:t>
+              <a:t>01.02.2025</a:t>
             </a:fld>
             <a:endParaRPr lang="ru-RU"/>
           </a:p>
@@ -3039,6 +3048,424 @@
   <p:clrMapOvr>
     <a:masterClrMapping/>
   </p:clrMapOvr>
+  <p:timing>
+    <p:tnLst>
+      <p:par>
+        <p:cTn id="1" dur="indefinite" restart="never" nodeType="tmRoot"/>
+      </p:par>
+    </p:tnLst>
+  </p:timing>
+</p:sld>
+</file>
+
+<file path=ppt/slides/slide2.xml><?xml version="1.0" encoding="utf-8"?>
+<p:sld xmlns:a="http://schemas.openxmlformats.org/drawingml/2006/main" xmlns:r="http://schemas.openxmlformats.org/officeDocument/2006/relationships" xmlns:p="http://schemas.openxmlformats.org/presentationml/2006/main">
+  <p:cSld>
+    <p:spTree>
+      <p:nvGrpSpPr>
+        <p:cNvPr id="1" name=""/>
+        <p:cNvGrpSpPr/>
+        <p:nvPr/>
+      </p:nvGrpSpPr>
+      <p:grpSpPr>
+        <a:xfrm>
+          <a:off x="0" y="0"/>
+          <a:ext cx="0" cy="0"/>
+          <a:chOff x="0" y="0"/>
+          <a:chExt cx="0" cy="0"/>
+        </a:xfrm>
+      </p:grpSpPr>
+      <p:sp>
+        <p:nvSpPr>
+          <p:cNvPr id="2" name="Заголовок 1"/>
+          <p:cNvSpPr>
+            <a:spLocks noGrp="1"/>
+          </p:cNvSpPr>
+          <p:nvPr>
+            <p:ph type="title"/>
+          </p:nvPr>
+        </p:nvSpPr>
+        <p:spPr/>
+        <p:txBody>
+          <a:bodyPr/>
+          <a:lstStyle/>
+          <a:p>
+            <a:r>
+              <a:rPr lang="ru-RU" dirty="0" smtClean="0"/>
+              <a:t>Цели и задачи</a:t>
+            </a:r>
+            <a:endParaRPr lang="ru-RU" dirty="0"/>
+          </a:p>
+        </p:txBody>
+      </p:sp>
+      <p:sp>
+        <p:nvSpPr>
+          <p:cNvPr id="3" name="Объект 2"/>
+          <p:cNvSpPr>
+            <a:spLocks noGrp="1"/>
+          </p:cNvSpPr>
+          <p:nvPr>
+            <p:ph idx="1"/>
+          </p:nvPr>
+        </p:nvSpPr>
+        <p:spPr/>
+        <p:txBody>
+          <a:bodyPr/>
+          <a:lstStyle/>
+          <a:p>
+            <a:r>
+              <a:rPr lang="ru-RU" dirty="0" smtClean="0"/>
+              <a:t>Цель: создать игру, в которой пользователю необходимо пройти лабиринт как можно быстрее, избегая встречи с врагами.</a:t>
+            </a:r>
+          </a:p>
+          <a:p>
+            <a:r>
+              <a:rPr lang="ru-RU" dirty="0" smtClean="0"/>
+              <a:t>Задачи: </a:t>
+            </a:r>
+          </a:p>
+          <a:p>
+            <a:pPr marL="971550" lvl="1" indent="-514350">
+              <a:buFont typeface="+mj-lt"/>
+              <a:buAutoNum type="arabicPeriod"/>
+            </a:pPr>
+            <a:r>
+              <a:rPr lang="ru-RU" dirty="0" smtClean="0"/>
+              <a:t>Реализовать псевдо 3</a:t>
+            </a:r>
+            <a:r>
+              <a:rPr lang="en-US" dirty="0" smtClean="0"/>
+              <a:t>D </a:t>
+            </a:r>
+            <a:r>
+              <a:rPr lang="ru-RU" dirty="0" smtClean="0"/>
+              <a:t>графику для игры.</a:t>
+            </a:r>
+          </a:p>
+          <a:p>
+            <a:pPr marL="971550" lvl="1" indent="-514350">
+              <a:buFont typeface="+mj-lt"/>
+              <a:buAutoNum type="arabicPeriod"/>
+            </a:pPr>
+            <a:r>
+              <a:rPr lang="ru-RU" dirty="0" smtClean="0"/>
+              <a:t>Написать алгоритм генерации лабиринта.</a:t>
+            </a:r>
+          </a:p>
+          <a:p>
+            <a:pPr marL="971550" lvl="1" indent="-514350">
+              <a:buFont typeface="+mj-lt"/>
+              <a:buAutoNum type="arabicPeriod"/>
+            </a:pPr>
+            <a:r>
+              <a:rPr lang="ru-RU" dirty="0" smtClean="0"/>
+              <a:t>В процессе.</a:t>
+            </a:r>
+            <a:endParaRPr lang="ru-RU" dirty="0"/>
+          </a:p>
+        </p:txBody>
+      </p:sp>
+    </p:spTree>
+    <p:extLst>
+      <p:ext uri="{BB962C8B-B14F-4D97-AF65-F5344CB8AC3E}">
+        <p14:creationId xmlns:p14="http://schemas.microsoft.com/office/powerpoint/2010/main" val="3090755641"/>
+      </p:ext>
+    </p:extLst>
+  </p:cSld>
+  <p:clrMapOvr>
+    <a:masterClrMapping/>
+  </p:clrMapOvr>
+  <p:timing>
+    <p:tnLst>
+      <p:par>
+        <p:cTn id="1" dur="indefinite" restart="never" nodeType="tmRoot"/>
+      </p:par>
+    </p:tnLst>
+  </p:timing>
+</p:sld>
+</file>
+
+<file path=ppt/slides/slide3.xml><?xml version="1.0" encoding="utf-8"?>
+<p:sld xmlns:a="http://schemas.openxmlformats.org/drawingml/2006/main" xmlns:r="http://schemas.openxmlformats.org/officeDocument/2006/relationships" xmlns:p="http://schemas.openxmlformats.org/presentationml/2006/main">
+  <p:cSld>
+    <p:spTree>
+      <p:nvGrpSpPr>
+        <p:cNvPr id="1" name=""/>
+        <p:cNvGrpSpPr/>
+        <p:nvPr/>
+      </p:nvGrpSpPr>
+      <p:grpSpPr>
+        <a:xfrm>
+          <a:off x="0" y="0"/>
+          <a:ext cx="0" cy="0"/>
+          <a:chOff x="0" y="0"/>
+          <a:chExt cx="0" cy="0"/>
+        </a:xfrm>
+      </p:grpSpPr>
+      <p:sp>
+        <p:nvSpPr>
+          <p:cNvPr id="2" name="Заголовок 1"/>
+          <p:cNvSpPr>
+            <a:spLocks noGrp="1"/>
+          </p:cNvSpPr>
+          <p:nvPr>
+            <p:ph type="title"/>
+          </p:nvPr>
+        </p:nvSpPr>
+        <p:spPr/>
+        <p:txBody>
+          <a:bodyPr/>
+          <a:lstStyle/>
+          <a:p>
+            <a:r>
+              <a:rPr lang="ru-RU" dirty="0" smtClean="0"/>
+              <a:t>Описание проекта</a:t>
+            </a:r>
+            <a:endParaRPr lang="ru-RU" dirty="0"/>
+          </a:p>
+        </p:txBody>
+      </p:sp>
+      <p:sp>
+        <p:nvSpPr>
+          <p:cNvPr id="3" name="Объект 2"/>
+          <p:cNvSpPr>
+            <a:spLocks noGrp="1"/>
+          </p:cNvSpPr>
+          <p:nvPr>
+            <p:ph idx="1"/>
+          </p:nvPr>
+        </p:nvSpPr>
+        <p:spPr/>
+        <p:txBody>
+          <a:bodyPr/>
+          <a:lstStyle/>
+          <a:p>
+            <a:r>
+              <a:rPr lang="ru-RU" dirty="0" smtClean="0"/>
+              <a:t>В процессе создания.</a:t>
+            </a:r>
+            <a:endParaRPr lang="ru-RU" dirty="0"/>
+          </a:p>
+        </p:txBody>
+      </p:sp>
+    </p:spTree>
+    <p:extLst>
+      <p:ext uri="{BB962C8B-B14F-4D97-AF65-F5344CB8AC3E}">
+        <p14:creationId xmlns:p14="http://schemas.microsoft.com/office/powerpoint/2010/main" val="4224329825"/>
+      </p:ext>
+    </p:extLst>
+  </p:cSld>
+  <p:clrMapOvr>
+    <a:masterClrMapping/>
+  </p:clrMapOvr>
+  <p:timing>
+    <p:tnLst>
+      <p:par>
+        <p:cTn id="1" dur="indefinite" restart="never" nodeType="tmRoot"/>
+      </p:par>
+    </p:tnLst>
+  </p:timing>
+</p:sld>
+</file>
+
+<file path=ppt/slides/slide4.xml><?xml version="1.0" encoding="utf-8"?>
+<p:sld xmlns:a="http://schemas.openxmlformats.org/drawingml/2006/main" xmlns:r="http://schemas.openxmlformats.org/officeDocument/2006/relationships" xmlns:p="http://schemas.openxmlformats.org/presentationml/2006/main">
+  <p:cSld>
+    <p:spTree>
+      <p:nvGrpSpPr>
+        <p:cNvPr id="1" name=""/>
+        <p:cNvGrpSpPr/>
+        <p:nvPr/>
+      </p:nvGrpSpPr>
+      <p:grpSpPr>
+        <a:xfrm>
+          <a:off x="0" y="0"/>
+          <a:ext cx="0" cy="0"/>
+          <a:chOff x="0" y="0"/>
+          <a:chExt cx="0" cy="0"/>
+        </a:xfrm>
+      </p:grpSpPr>
+      <p:sp>
+        <p:nvSpPr>
+          <p:cNvPr id="2" name="Заголовок 1"/>
+          <p:cNvSpPr>
+            <a:spLocks noGrp="1"/>
+          </p:cNvSpPr>
+          <p:nvPr>
+            <p:ph type="title"/>
+          </p:nvPr>
+        </p:nvSpPr>
+        <p:spPr/>
+        <p:txBody>
+          <a:bodyPr/>
+          <a:lstStyle/>
+          <a:p>
+            <a:r>
+              <a:rPr lang="ru-RU" dirty="0" smtClean="0"/>
+              <a:t>Используемые файлы</a:t>
+            </a:r>
+            <a:endParaRPr lang="ru-RU" dirty="0"/>
+          </a:p>
+        </p:txBody>
+      </p:sp>
+      <p:sp>
+        <p:nvSpPr>
+          <p:cNvPr id="3" name="Объект 2"/>
+          <p:cNvSpPr>
+            <a:spLocks noGrp="1"/>
+          </p:cNvSpPr>
+          <p:nvPr>
+            <p:ph idx="1"/>
+          </p:nvPr>
+        </p:nvSpPr>
+        <p:spPr/>
+        <p:txBody>
+          <a:bodyPr/>
+          <a:lstStyle/>
+          <a:p>
+            <a:r>
+              <a:rPr lang="en-US" dirty="0" smtClean="0"/>
+              <a:t>main.py – </a:t>
+            </a:r>
+            <a:r>
+              <a:rPr lang="ru-RU" dirty="0" smtClean="0"/>
+              <a:t>главный файл программы</a:t>
+            </a:r>
+            <a:endParaRPr lang="en-US" dirty="0" smtClean="0"/>
+          </a:p>
+          <a:p>
+            <a:pPr marL="0" indent="0">
+              <a:buNone/>
+            </a:pPr>
+            <a:endParaRPr lang="ru-RU" dirty="0"/>
+          </a:p>
+        </p:txBody>
+      </p:sp>
+    </p:spTree>
+    <p:extLst>
+      <p:ext uri="{BB962C8B-B14F-4D97-AF65-F5344CB8AC3E}">
+        <p14:creationId xmlns:p14="http://schemas.microsoft.com/office/powerpoint/2010/main" val="1563189276"/>
+      </p:ext>
+    </p:extLst>
+  </p:cSld>
+  <p:clrMapOvr>
+    <a:masterClrMapping/>
+  </p:clrMapOvr>
+  <p:timing>
+    <p:tnLst>
+      <p:par>
+        <p:cTn id="1" dur="indefinite" restart="never" nodeType="tmRoot"/>
+      </p:par>
+    </p:tnLst>
+  </p:timing>
+</p:sld>
+</file>
+
+<file path=ppt/slides/slide5.xml><?xml version="1.0" encoding="utf-8"?>
+<p:sld xmlns:a="http://schemas.openxmlformats.org/drawingml/2006/main" xmlns:r="http://schemas.openxmlformats.org/officeDocument/2006/relationships" xmlns:p="http://schemas.openxmlformats.org/presentationml/2006/main">
+  <p:cSld>
+    <p:spTree>
+      <p:nvGrpSpPr>
+        <p:cNvPr id="1" name=""/>
+        <p:cNvGrpSpPr/>
+        <p:nvPr/>
+      </p:nvGrpSpPr>
+      <p:grpSpPr>
+        <a:xfrm>
+          <a:off x="0" y="0"/>
+          <a:ext cx="0" cy="0"/>
+          <a:chOff x="0" y="0"/>
+          <a:chExt cx="0" cy="0"/>
+        </a:xfrm>
+      </p:grpSpPr>
+      <p:sp>
+        <p:nvSpPr>
+          <p:cNvPr id="2" name="Заголовок 1"/>
+          <p:cNvSpPr>
+            <a:spLocks noGrp="1"/>
+          </p:cNvSpPr>
+          <p:nvPr>
+            <p:ph type="title"/>
+          </p:nvPr>
+        </p:nvSpPr>
+        <p:spPr/>
+        <p:txBody>
+          <a:bodyPr/>
+          <a:lstStyle/>
+          <a:p>
+            <a:r>
+              <a:rPr lang="ru-RU" dirty="0" smtClean="0"/>
+              <a:t>Используемые технологии</a:t>
+            </a:r>
+            <a:endParaRPr lang="ru-RU" dirty="0"/>
+          </a:p>
+        </p:txBody>
+      </p:sp>
+      <p:sp>
+        <p:nvSpPr>
+          <p:cNvPr id="3" name="Объект 2"/>
+          <p:cNvSpPr>
+            <a:spLocks noGrp="1"/>
+          </p:cNvSpPr>
+          <p:nvPr>
+            <p:ph idx="1"/>
+          </p:nvPr>
+        </p:nvSpPr>
+        <p:spPr/>
+        <p:txBody>
+          <a:bodyPr/>
+          <a:lstStyle/>
+          <a:p>
+            <a:r>
+              <a:rPr lang="ru-RU" dirty="0" smtClean="0"/>
+              <a:t>Язык программирования </a:t>
+            </a:r>
+            <a:r>
+              <a:rPr lang="en-US" dirty="0" smtClean="0"/>
+              <a:t>python 3.nn</a:t>
+            </a:r>
+          </a:p>
+          <a:p>
+            <a:r>
+              <a:rPr lang="ru-RU" dirty="0" smtClean="0"/>
+              <a:t>Библиотека </a:t>
+            </a:r>
+            <a:r>
+              <a:rPr lang="en-US" dirty="0" err="1" smtClean="0"/>
+              <a:t>pygame</a:t>
+            </a:r>
+            <a:endParaRPr lang="en-US" dirty="0" smtClean="0"/>
+          </a:p>
+          <a:p>
+            <a:r>
+              <a:rPr lang="ru-RU" dirty="0" smtClean="0"/>
+              <a:t>Библиотека </a:t>
+            </a:r>
+            <a:r>
+              <a:rPr lang="en-US" smtClean="0"/>
+              <a:t>sqlite3</a:t>
+            </a:r>
+            <a:endParaRPr lang="ru-RU" dirty="0"/>
+          </a:p>
+        </p:txBody>
+      </p:sp>
+    </p:spTree>
+    <p:extLst>
+      <p:ext uri="{BB962C8B-B14F-4D97-AF65-F5344CB8AC3E}">
+        <p14:creationId xmlns:p14="http://schemas.microsoft.com/office/powerpoint/2010/main" val="3060250560"/>
+      </p:ext>
+    </p:extLst>
+  </p:cSld>
+  <p:clrMapOvr>
+    <a:masterClrMapping/>
+  </p:clrMapOvr>
+  <p:timing>
+    <p:tnLst>
+      <p:par>
+        <p:cTn id="1" dur="indefinite" restart="never" nodeType="tmRoot"/>
+      </p:par>
+    </p:tnLst>
+  </p:timing>
 </p:sld>
 </file>
 

</xml_diff>